<commit_message>
Apresentação e roteiro adicionados
</commit_message>
<xml_diff>
--- a/Projeto_Normalização/Apresentação_Final/AulaInvertida_Normalizacao.pptx
+++ b/Projeto_Normalização/Apresentação_Final/AulaInvertida_Normalizacao.pptx
@@ -6752,10 +6752,10 @@
       </p:pic>
       <p:pic>
         <p:nvPicPr>
-          <p:cNvPr id="14" name="Imagem 13" descr="Tabela&#10;&#10;Descrição gerada automaticamente">
+          <p:cNvPr id="16" name="Imagem 15" descr="Tabela&#10;&#10;Descrição gerada automaticamente">
             <a:extLst>
               <a:ext uri="{FF2B5EF4-FFF2-40B4-BE49-F238E27FC236}">
-                <a16:creationId xmlns:a16="http://schemas.microsoft.com/office/drawing/2014/main" id="{3ECABB33-CF12-41B8-A4B7-F41511DA6EC9}"/>
+                <a16:creationId xmlns:a16="http://schemas.microsoft.com/office/drawing/2014/main" id="{5495DA47-728B-435D-A069-ECA24C3702AF}"/>
               </a:ext>
             </a:extLst>
           </p:cNvPr>
@@ -6772,8 +6772,8 @@
         </p:blipFill>
         <p:spPr>
           <a:xfrm>
-            <a:off x="915043" y="4263219"/>
-            <a:ext cx="7595911" cy="1453958"/>
+            <a:off x="890456" y="2846134"/>
+            <a:ext cx="7624893" cy="1259407"/>
           </a:xfrm>
           <a:prstGeom prst="rect">
             <a:avLst/>
@@ -6782,10 +6782,10 @@
       </p:pic>
       <p:pic>
         <p:nvPicPr>
-          <p:cNvPr id="16" name="Imagem 15" descr="Tabela&#10;&#10;Descrição gerada automaticamente">
+          <p:cNvPr id="4" name="Imagem 3">
             <a:extLst>
               <a:ext uri="{FF2B5EF4-FFF2-40B4-BE49-F238E27FC236}">
-                <a16:creationId xmlns:a16="http://schemas.microsoft.com/office/drawing/2014/main" id="{5495DA47-728B-435D-A069-ECA24C3702AF}"/>
+                <a16:creationId xmlns:a16="http://schemas.microsoft.com/office/drawing/2014/main" id="{D5B053E3-E8AF-4ADF-AD8E-9280434B4D4C}"/>
               </a:ext>
             </a:extLst>
           </p:cNvPr>
@@ -6802,8 +6802,8 @@
         </p:blipFill>
         <p:spPr>
           <a:xfrm>
-            <a:off x="890456" y="2846134"/>
-            <a:ext cx="7624893" cy="1259407"/>
+            <a:off x="990449" y="4252562"/>
+            <a:ext cx="7524900" cy="1745747"/>
           </a:xfrm>
           <a:prstGeom prst="rect">
             <a:avLst/>
@@ -6999,105 +6999,6 @@
                                         <p:cTn id="16" dur="1000" fill="hold"/>
                                         <p:tgtEl>
                                           <p:spTgt spid="16"/>
-                                        </p:tgtEl>
-                                        <p:attrNameLst>
-                                          <p:attrName>ppt_y</p:attrName>
-                                        </p:attrNameLst>
-                                      </p:cBhvr>
-                                      <p:tavLst>
-                                        <p:tav tm="0">
-                                          <p:val>
-                                            <p:strVal val="#ppt_y+.1"/>
-                                          </p:val>
-                                        </p:tav>
-                                        <p:tav tm="100000">
-                                          <p:val>
-                                            <p:strVal val="#ppt_y"/>
-                                          </p:val>
-                                        </p:tav>
-                                      </p:tavLst>
-                                    </p:anim>
-                                  </p:childTnLst>
-                                </p:cTn>
-                              </p:par>
-                            </p:childTnLst>
-                          </p:cTn>
-                        </p:par>
-                      </p:childTnLst>
-                    </p:cTn>
-                  </p:par>
-                  <p:par>
-                    <p:cTn id="17" fill="hold">
-                      <p:stCondLst>
-                        <p:cond delay="indefinite"/>
-                      </p:stCondLst>
-                      <p:childTnLst>
-                        <p:par>
-                          <p:cTn id="18" fill="hold">
-                            <p:stCondLst>
-                              <p:cond delay="0"/>
-                            </p:stCondLst>
-                            <p:childTnLst>
-                              <p:par>
-                                <p:cTn id="19" presetID="42" presetClass="entr" presetSubtype="0" fill="hold" nodeType="clickEffect">
-                                  <p:stCondLst>
-                                    <p:cond delay="0"/>
-                                  </p:stCondLst>
-                                  <p:childTnLst>
-                                    <p:set>
-                                      <p:cBhvr>
-                                        <p:cTn id="20" dur="1" fill="hold">
-                                          <p:stCondLst>
-                                            <p:cond delay="0"/>
-                                          </p:stCondLst>
-                                        </p:cTn>
-                                        <p:tgtEl>
-                                          <p:spTgt spid="14"/>
-                                        </p:tgtEl>
-                                        <p:attrNameLst>
-                                          <p:attrName>style.visibility</p:attrName>
-                                        </p:attrNameLst>
-                                      </p:cBhvr>
-                                      <p:to>
-                                        <p:strVal val="visible"/>
-                                      </p:to>
-                                    </p:set>
-                                    <p:animEffect transition="in" filter="fade">
-                                      <p:cBhvr>
-                                        <p:cTn id="21" dur="1000"/>
-                                        <p:tgtEl>
-                                          <p:spTgt spid="14"/>
-                                        </p:tgtEl>
-                                      </p:cBhvr>
-                                    </p:animEffect>
-                                    <p:anim calcmode="lin" valueType="num">
-                                      <p:cBhvr>
-                                        <p:cTn id="22" dur="1000" fill="hold"/>
-                                        <p:tgtEl>
-                                          <p:spTgt spid="14"/>
-                                        </p:tgtEl>
-                                        <p:attrNameLst>
-                                          <p:attrName>ppt_x</p:attrName>
-                                        </p:attrNameLst>
-                                      </p:cBhvr>
-                                      <p:tavLst>
-                                        <p:tav tm="0">
-                                          <p:val>
-                                            <p:strVal val="#ppt_x"/>
-                                          </p:val>
-                                        </p:tav>
-                                        <p:tav tm="100000">
-                                          <p:val>
-                                            <p:strVal val="#ppt_x"/>
-                                          </p:val>
-                                        </p:tav>
-                                      </p:tavLst>
-                                    </p:anim>
-                                    <p:anim calcmode="lin" valueType="num">
-                                      <p:cBhvr>
-                                        <p:cTn id="23" dur="1000" fill="hold"/>
-                                        <p:tgtEl>
-                                          <p:spTgt spid="14"/>
                                         </p:tgtEl>
                                         <p:attrNameLst>
                                           <p:attrName>ppt_y</p:attrName>
@@ -18952,6 +18853,15 @@
 </file>
 
 <file path=customXml/item1.xml><?xml version="1.0" encoding="utf-8"?>
+<?mso-contentType ?>
+<FormTemplates xmlns="http://schemas.microsoft.com/sharepoint/v3/contenttype/forms">
+  <Display>DocumentLibraryForm</Display>
+  <Edit>DocumentLibraryForm</Edit>
+  <New>DocumentLibraryForm</New>
+</FormTemplates>
+</file>
+
+<file path=customXml/item2.xml><?xml version="1.0" encoding="utf-8"?>
 <ct:contentTypeSchema xmlns:ct="http://schemas.microsoft.com/office/2006/metadata/contentType" xmlns:ma="http://schemas.microsoft.com/office/2006/metadata/properties/metaAttributes" ct:_="" ma:_="" ma:contentTypeName="Documento" ma:contentTypeID="0x0101001C0BDCB75C490F449996D271113E7085" ma:contentTypeVersion="12" ma:contentTypeDescription="Crie um novo documento." ma:contentTypeScope="" ma:versionID="f78031fe7deaa61be8293be56c3571d3">
   <xsd:schema xmlns:xsd="http://www.w3.org/2001/XMLSchema" xmlns:xs="http://www.w3.org/2001/XMLSchema" xmlns:p="http://schemas.microsoft.com/office/2006/metadata/properties" xmlns:ns2="56135199-fddc-46f9-8522-4d2f2df906d6" xmlns:ns3="616ddcb6-37a4-4b68-9e62-eadd2126515b" targetNamespace="http://schemas.microsoft.com/office/2006/metadata/properties" ma:root="true" ma:fieldsID="84b82f449ed318020166b0b852c53661" ns2:_="" ns3:_="">
     <xsd:import namespace="56135199-fddc-46f9-8522-4d2f2df906d6"/>
@@ -19168,15 +19078,6 @@
 </ct:contentTypeSchema>
 </file>
 
-<file path=customXml/item2.xml><?xml version="1.0" encoding="utf-8"?>
-<?mso-contentType ?>
-<FormTemplates xmlns="http://schemas.microsoft.com/sharepoint/v3/contenttype/forms">
-  <Display>DocumentLibraryForm</Display>
-  <Edit>DocumentLibraryForm</Edit>
-  <New>DocumentLibraryForm</New>
-</FormTemplates>
-</file>
-
 <file path=customXml/item3.xml><?xml version="1.0" encoding="utf-8"?>
 <p:properties xmlns:p="http://schemas.microsoft.com/office/2006/metadata/properties" xmlns:xsi="http://www.w3.org/2001/XMLSchema-instance" xmlns:pc="http://schemas.microsoft.com/office/infopath/2007/PartnerControls">
   <documentManagement/>
@@ -19184,6 +19085,14 @@
 </file>
 
 <file path=customXml/itemProps1.xml><?xml version="1.0" encoding="utf-8"?>
+<ds:datastoreItem xmlns:ds="http://schemas.openxmlformats.org/officeDocument/2006/customXml" ds:itemID="{8AEFDE86-9ABD-4B53-9EB0-611E0710241D}">
+  <ds:schemaRefs>
+    <ds:schemaRef ds:uri="http://schemas.microsoft.com/sharepoint/v3/contenttype/forms"/>
+  </ds:schemaRefs>
+</ds:datastoreItem>
+</file>
+
+<file path=customXml/itemProps2.xml><?xml version="1.0" encoding="utf-8"?>
 <ds:datastoreItem xmlns:ds="http://schemas.openxmlformats.org/officeDocument/2006/customXml" ds:itemID="{DD46F767-487D-45A7-9383-4F9F29521278}">
   <ds:schemaRefs>
     <ds:schemaRef ds:uri="56135199-fddc-46f9-8522-4d2f2df906d6"/>
@@ -19202,14 +19111,6 @@
 </ds:datastoreItem>
 </file>
 
-<file path=customXml/itemProps2.xml><?xml version="1.0" encoding="utf-8"?>
-<ds:datastoreItem xmlns:ds="http://schemas.openxmlformats.org/officeDocument/2006/customXml" ds:itemID="{8AEFDE86-9ABD-4B53-9EB0-611E0710241D}">
-  <ds:schemaRefs>
-    <ds:schemaRef ds:uri="http://schemas.microsoft.com/sharepoint/v3/contenttype/forms"/>
-  </ds:schemaRefs>
-</ds:datastoreItem>
-</file>
-
 <file path=customXml/itemProps3.xml><?xml version="1.0" encoding="utf-8"?>
 <ds:datastoreItem xmlns:ds="http://schemas.openxmlformats.org/officeDocument/2006/customXml" ds:itemID="{7598036D-8F24-4150-8883-4040B39D685E}">
   <ds:schemaRefs>

</xml_diff>